<commit_message>
Updated after further review
Updated after further review
</commit_message>
<xml_diff>
--- a/Project2_HypothesisTesting_NonTechnicalPresentation.pptx
+++ b/Project2_HypothesisTesting_NonTechnicalPresentation.pptx
@@ -301,7 +301,7 @@
           <a:p>
             <a:fld id="{DA2E1FCE-6484-8846-A653-8EE9D37FC717}" type="datetimeFigureOut">
               <a:rPr lang="en-US" smtClean="0"/>
-              <a:t>07/03/20</a:t>
+              <a:t>09/03/20</a:t>
             </a:fld>
             <a:endParaRPr lang="en-US"/>
           </a:p>
@@ -471,7 +471,7 @@
           <a:p>
             <a:fld id="{DA2E1FCE-6484-8846-A653-8EE9D37FC717}" type="datetimeFigureOut">
               <a:rPr lang="en-US" smtClean="0"/>
-              <a:t>07/03/20</a:t>
+              <a:t>09/03/20</a:t>
             </a:fld>
             <a:endParaRPr lang="en-US"/>
           </a:p>
@@ -651,7 +651,7 @@
           <a:p>
             <a:fld id="{DA2E1FCE-6484-8846-A653-8EE9D37FC717}" type="datetimeFigureOut">
               <a:rPr lang="en-US" smtClean="0"/>
-              <a:t>07/03/20</a:t>
+              <a:t>09/03/20</a:t>
             </a:fld>
             <a:endParaRPr lang="en-US"/>
           </a:p>
@@ -821,7 +821,7 @@
           <a:p>
             <a:fld id="{DA2E1FCE-6484-8846-A653-8EE9D37FC717}" type="datetimeFigureOut">
               <a:rPr lang="en-US" smtClean="0"/>
-              <a:t>07/03/20</a:t>
+              <a:t>09/03/20</a:t>
             </a:fld>
             <a:endParaRPr lang="en-US"/>
           </a:p>
@@ -1067,7 +1067,7 @@
           <a:p>
             <a:fld id="{DA2E1FCE-6484-8846-A653-8EE9D37FC717}" type="datetimeFigureOut">
               <a:rPr lang="en-US" smtClean="0"/>
-              <a:t>07/03/20</a:t>
+              <a:t>09/03/20</a:t>
             </a:fld>
             <a:endParaRPr lang="en-US"/>
           </a:p>
@@ -1355,7 +1355,7 @@
           <a:p>
             <a:fld id="{DA2E1FCE-6484-8846-A653-8EE9D37FC717}" type="datetimeFigureOut">
               <a:rPr lang="en-US" smtClean="0"/>
-              <a:t>07/03/20</a:t>
+              <a:t>09/03/20</a:t>
             </a:fld>
             <a:endParaRPr lang="en-US"/>
           </a:p>
@@ -1777,7 +1777,7 @@
           <a:p>
             <a:fld id="{DA2E1FCE-6484-8846-A653-8EE9D37FC717}" type="datetimeFigureOut">
               <a:rPr lang="en-US" smtClean="0"/>
-              <a:t>07/03/20</a:t>
+              <a:t>09/03/20</a:t>
             </a:fld>
             <a:endParaRPr lang="en-US"/>
           </a:p>
@@ -1895,7 +1895,7 @@
           <a:p>
             <a:fld id="{DA2E1FCE-6484-8846-A653-8EE9D37FC717}" type="datetimeFigureOut">
               <a:rPr lang="en-US" smtClean="0"/>
-              <a:t>07/03/20</a:t>
+              <a:t>09/03/20</a:t>
             </a:fld>
             <a:endParaRPr lang="en-US"/>
           </a:p>
@@ -1990,7 +1990,7 @@
           <a:p>
             <a:fld id="{DA2E1FCE-6484-8846-A653-8EE9D37FC717}" type="datetimeFigureOut">
               <a:rPr lang="en-US" smtClean="0"/>
-              <a:t>07/03/20</a:t>
+              <a:t>09/03/20</a:t>
             </a:fld>
             <a:endParaRPr lang="en-US"/>
           </a:p>
@@ -2267,7 +2267,7 @@
           <a:p>
             <a:fld id="{DA2E1FCE-6484-8846-A653-8EE9D37FC717}" type="datetimeFigureOut">
               <a:rPr lang="en-US" smtClean="0"/>
-              <a:t>07/03/20</a:t>
+              <a:t>09/03/20</a:t>
             </a:fld>
             <a:endParaRPr lang="en-US"/>
           </a:p>
@@ -2520,7 +2520,7 @@
           <a:p>
             <a:fld id="{DA2E1FCE-6484-8846-A653-8EE9D37FC717}" type="datetimeFigureOut">
               <a:rPr lang="en-US" smtClean="0"/>
-              <a:t>07/03/20</a:t>
+              <a:t>09/03/20</a:t>
             </a:fld>
             <a:endParaRPr lang="en-US"/>
           </a:p>
@@ -2733,7 +2733,7 @@
           <a:p>
             <a:fld id="{DA2E1FCE-6484-8846-A653-8EE9D37FC717}" type="datetimeFigureOut">
               <a:rPr lang="en-US" smtClean="0"/>
-              <a:t>07/03/20</a:t>
+              <a:t>09/03/20</a:t>
             </a:fld>
             <a:endParaRPr lang="en-US"/>
           </a:p>
@@ -3349,23 +3349,7 @@
                   <a:srgbClr val="7F7F7F"/>
                 </a:solidFill>
               </a:rPr>
-              <a:t>Month with </a:t>
-            </a:r>
-            <a:r>
-              <a:rPr lang="en-US" sz="3200" dirty="0" smtClean="0">
-                <a:solidFill>
-                  <a:srgbClr val="7F7F7F"/>
-                </a:solidFill>
-              </a:rPr>
-              <a:t>d</a:t>
-            </a:r>
-            <a:r>
-              <a:rPr lang="en-US" sz="3200" dirty="0" smtClean="0">
-                <a:solidFill>
-                  <a:srgbClr val="7F7F7F"/>
-                </a:solidFill>
-              </a:rPr>
-              <a:t>iscounts effect on </a:t>
+              <a:t>Month with discounts effect on </a:t>
             </a:r>
             <a:br>
               <a:rPr lang="en-US" sz="3200" dirty="0" smtClean="0">
@@ -3525,7 +3509,31 @@
                   <a:srgbClr val="7F7F7F"/>
                 </a:solidFill>
               </a:rPr>
-              <a:t>on the total sales as compared to other months with discounts.</a:t>
+              <a:t>on the </a:t>
+            </a:r>
+            <a:r>
+              <a:rPr lang="en-US" sz="2000" smtClean="0">
+                <a:solidFill>
+                  <a:srgbClr val="7F7F7F"/>
+                </a:solidFill>
+              </a:rPr>
+              <a:t>total </a:t>
+            </a:r>
+            <a:r>
+              <a:rPr lang="en-US" sz="2000" smtClean="0">
+                <a:solidFill>
+                  <a:srgbClr val="7F7F7F"/>
+                </a:solidFill>
+              </a:rPr>
+              <a:t>spent </a:t>
+            </a:r>
+            <a:r>
+              <a:rPr lang="en-US" sz="2000" dirty="0" smtClean="0">
+                <a:solidFill>
+                  <a:srgbClr val="7F7F7F"/>
+                </a:solidFill>
+              </a:rPr>
+              <a:t>as compared to other months with discounts.</a:t>
             </a:r>
           </a:p>
         </p:txBody>
@@ -3560,11 +3568,6 @@
               </a:rPr>
               <a:t>4</a:t>
             </a:r>
-            <a:endParaRPr lang="en-US" sz="8000" b="1" dirty="0">
-              <a:solidFill>
-                <a:srgbClr val="FF0000"/>
-              </a:solidFill>
-            </a:endParaRPr>
           </a:p>
         </p:txBody>
       </p:sp>
@@ -3747,7 +3750,7 @@
                   </a:schemeClr>
                 </a:solidFill>
               </a:rPr>
-              <a:t>has sl</a:t>
+              <a:t>had </a:t>
             </a:r>
             <a:r>
               <a:rPr lang="en-US" dirty="0" smtClean="0">
@@ -3757,7 +3760,7 @@
                   </a:schemeClr>
                 </a:solidFill>
               </a:rPr>
-              <a:t>ight – medium effect on quantity ordered.</a:t>
+              <a:t>slight – medium effect on quantity ordered.</a:t>
             </a:r>
           </a:p>
           <a:p>
@@ -3821,13 +3824,6 @@
               </a:rPr>
               <a:t>total sales in an order.</a:t>
             </a:r>
-            <a:endParaRPr lang="en-US" dirty="0" smtClean="0">
-              <a:solidFill>
-                <a:schemeClr val="bg1">
-                  <a:lumMod val="50000"/>
-                </a:schemeClr>
-              </a:solidFill>
-            </a:endParaRPr>
           </a:p>
           <a:p>
             <a:r>
@@ -3838,8 +3834,10 @@
                   </a:schemeClr>
                 </a:solidFill>
               </a:rPr>
-              <a:t>Offering </a:t>
-            </a:r>
+              <a:t>Offering a 5% discount instead of 25% may be profitable as they both have similar effects on the quantity and total sale of products.</a:t>
+            </a:r>
+          </a:p>
+          <a:p>
             <a:r>
               <a:rPr lang="en-US" dirty="0" smtClean="0">
                 <a:solidFill>
@@ -3848,37 +3846,8 @@
                   </a:schemeClr>
                 </a:solidFill>
               </a:rPr>
-              <a:t>a 5% discount instead of 25% may be profitable as they both have similar effects on the quantity and total sale of products</a:t>
-            </a:r>
-            <a:r>
-              <a:rPr lang="en-US" dirty="0" smtClean="0">
-                <a:solidFill>
-                  <a:schemeClr val="bg1">
-                    <a:lumMod val="50000"/>
-                  </a:schemeClr>
-                </a:solidFill>
-              </a:rPr>
-              <a:t>.</a:t>
-            </a:r>
-          </a:p>
-          <a:p>
-            <a:r>
-              <a:rPr lang="en-US" dirty="0" smtClean="0">
-                <a:solidFill>
-                  <a:schemeClr val="bg1">
-                    <a:lumMod val="50000"/>
-                  </a:schemeClr>
-                </a:solidFill>
-              </a:rPr>
               <a:t>The discounted month does not have a significantly different effect to other discounted months.</a:t>
             </a:r>
-            <a:endParaRPr lang="en-US" dirty="0" smtClean="0">
-              <a:solidFill>
-                <a:schemeClr val="bg1">
-                  <a:lumMod val="50000"/>
-                </a:schemeClr>
-              </a:solidFill>
-            </a:endParaRPr>
           </a:p>
           <a:p>
             <a:r>
@@ -4083,20 +4052,10 @@
                   </a:schemeClr>
                 </a:solidFill>
               </a:rPr>
-              <a:t>Does any month with discounts have a significant effect on the Quantity in an order?</a:t>
-            </a:r>
-          </a:p>
-          <a:p>
+              <a:t>Do </a:t>
+            </a:r>
             <a:r>
               <a:rPr lang="en-US" dirty="0" smtClean="0">
-                <a:solidFill>
-                  <a:srgbClr val="FF0000"/>
-                </a:solidFill>
-              </a:rPr>
-              <a:t>4] </a:t>
-            </a:r>
-            <a:r>
-              <a:rPr lang="en-US" dirty="0">
                 <a:solidFill>
                   <a:schemeClr val="tx1">
                     <a:lumMod val="50000"/>
@@ -4104,7 +4063,83 @@
                   </a:schemeClr>
                 </a:solidFill>
               </a:rPr>
-              <a:t>Does any month with discounts have a significant effect on the </a:t>
+              <a:t>any </a:t>
+            </a:r>
+            <a:r>
+              <a:rPr lang="en-US" dirty="0" smtClean="0">
+                <a:solidFill>
+                  <a:schemeClr val="tx1">
+                    <a:lumMod val="50000"/>
+                    <a:lumOff val="50000"/>
+                  </a:schemeClr>
+                </a:solidFill>
+              </a:rPr>
+              <a:t>months </a:t>
+            </a:r>
+            <a:r>
+              <a:rPr lang="en-US" dirty="0" smtClean="0">
+                <a:solidFill>
+                  <a:schemeClr val="tx1">
+                    <a:lumMod val="50000"/>
+                    <a:lumOff val="50000"/>
+                  </a:schemeClr>
+                </a:solidFill>
+              </a:rPr>
+              <a:t>with discounts have a significant effect on the Quantity in an order?</a:t>
+            </a:r>
+          </a:p>
+          <a:p>
+            <a:r>
+              <a:rPr lang="en-US" dirty="0" smtClean="0">
+                <a:solidFill>
+                  <a:srgbClr val="FF0000"/>
+                </a:solidFill>
+              </a:rPr>
+              <a:t>4] </a:t>
+            </a:r>
+            <a:r>
+              <a:rPr lang="en-US" dirty="0" smtClean="0">
+                <a:solidFill>
+                  <a:schemeClr val="tx1">
+                    <a:lumMod val="50000"/>
+                    <a:lumOff val="50000"/>
+                  </a:schemeClr>
+                </a:solidFill>
+              </a:rPr>
+              <a:t>Do </a:t>
+            </a:r>
+            <a:r>
+              <a:rPr lang="en-US" dirty="0">
+                <a:solidFill>
+                  <a:schemeClr val="tx1">
+                    <a:lumMod val="50000"/>
+                    <a:lumOff val="50000"/>
+                  </a:schemeClr>
+                </a:solidFill>
+              </a:rPr>
+              <a:t>any </a:t>
+            </a:r>
+            <a:r>
+              <a:rPr lang="en-US" dirty="0" smtClean="0">
+                <a:solidFill>
+                  <a:schemeClr val="tx1">
+                    <a:lumMod val="50000"/>
+                    <a:lumOff val="50000"/>
+                  </a:schemeClr>
+                </a:solidFill>
+              </a:rPr>
+              <a:t>months </a:t>
+            </a:r>
+            <a:r>
+              <a:rPr lang="en-US" dirty="0">
+                <a:solidFill>
+                  <a:schemeClr val="tx1">
+                    <a:lumMod val="50000"/>
+                    <a:lumOff val="50000"/>
+                  </a:schemeClr>
+                </a:solidFill>
+              </a:rPr>
+              <a:t>with discounts have a significant effect on the </a:t>
             </a:r>
             <a:r>
               <a:rPr lang="en-US" dirty="0" smtClean="0">
@@ -4141,6 +4176,13 @@
   <p:clrMapOvr>
     <a:masterClrMapping/>
   </p:clrMapOvr>
+  <p:timing>
+    <p:tnLst>
+      <p:par>
+        <p:cTn xmlns:p14="http://schemas.microsoft.com/office/powerpoint/2010/main" id="1" dur="indefinite" restart="never" nodeType="tmRoot"/>
+      </p:par>
+    </p:tnLst>
+  </p:timing>
 </p:sld>
 </file>
 
@@ -4547,11 +4589,6 @@
               </a:rPr>
               <a:t>an order</a:t>
             </a:r>
-            <a:endParaRPr lang="en-US" sz="3200" dirty="0">
-              <a:solidFill>
-                <a:srgbClr val="7F7F7F"/>
-              </a:solidFill>
-            </a:endParaRPr>
           </a:p>
         </p:txBody>
       </p:sp>
@@ -4908,11 +4945,7 @@
             </a:r>
             <a:r>
               <a:rPr lang="en-US" dirty="0" smtClean="0"/>
-              <a:t>		20</a:t>
-            </a:r>
-            <a:r>
-              <a:rPr lang="en-US" dirty="0" smtClean="0"/>
-              <a:t>%</a:t>
+              <a:t>		20%</a:t>
             </a:r>
           </a:p>
           <a:p>
@@ -5280,11 +5313,6 @@
               </a:rPr>
               <a:t>an order</a:t>
             </a:r>
-            <a:endParaRPr lang="en-US" sz="3200" dirty="0">
-              <a:solidFill>
-                <a:srgbClr val="7F7F7F"/>
-              </a:solidFill>
-            </a:endParaRPr>
           </a:p>
         </p:txBody>
       </p:sp>
@@ -5446,11 +5474,6 @@
               </a:rPr>
               <a:t>2</a:t>
             </a:r>
-            <a:endParaRPr lang="en-US" sz="8000" b="1" dirty="0">
-              <a:solidFill>
-                <a:srgbClr val="FF0000"/>
-              </a:solidFill>
-            </a:endParaRPr>
           </a:p>
         </p:txBody>
       </p:sp>
@@ -5562,15 +5585,7 @@
                   <a:srgbClr val="FF0000"/>
                 </a:solidFill>
               </a:rPr>
-              <a:t>5</a:t>
-            </a:r>
-            <a:r>
-              <a:rPr lang="en-US" dirty="0" smtClean="0">
-                <a:solidFill>
-                  <a:srgbClr val="FF0000"/>
-                </a:solidFill>
-              </a:rPr>
-              <a:t>%</a:t>
+              <a:t>5%</a:t>
             </a:r>
             <a:endParaRPr lang="en-US" dirty="0">
               <a:solidFill>
@@ -5588,15 +5603,7 @@
                   <a:srgbClr val="FF0000"/>
                 </a:solidFill>
               </a:rPr>
-              <a:t>	25</a:t>
-            </a:r>
-            <a:r>
-              <a:rPr lang="en-US" dirty="0" smtClean="0">
-                <a:solidFill>
-                  <a:srgbClr val="FF0000"/>
-                </a:solidFill>
-              </a:rPr>
-              <a:t>%</a:t>
+              <a:t>	25%</a:t>
             </a:r>
           </a:p>
           <a:p>
@@ -5727,23 +5734,7 @@
                   <a:srgbClr val="7F7F7F"/>
                 </a:solidFill>
               </a:rPr>
-              <a:t>Month with </a:t>
-            </a:r>
-            <a:r>
-              <a:rPr lang="en-US" sz="3200" dirty="0" smtClean="0">
-                <a:solidFill>
-                  <a:srgbClr val="7F7F7F"/>
-                </a:solidFill>
-              </a:rPr>
-              <a:t>d</a:t>
-            </a:r>
-            <a:r>
-              <a:rPr lang="en-US" sz="3200" dirty="0" smtClean="0">
-                <a:solidFill>
-                  <a:srgbClr val="7F7F7F"/>
-                </a:solidFill>
-              </a:rPr>
-              <a:t>iscounts effect on </a:t>
+              <a:t>Month with discounts effect on </a:t>
             </a:r>
             <a:br>
               <a:rPr lang="en-US" sz="3200" dirty="0" smtClean="0">
@@ -5774,7 +5765,15 @@
                   <a:srgbClr val="7F7F7F"/>
                 </a:solidFill>
               </a:rPr>
-              <a:t>on products in </a:t>
+              <a:t>of </a:t>
+            </a:r>
+            <a:r>
+              <a:rPr lang="en-US" sz="3200" dirty="0" smtClean="0">
+                <a:solidFill>
+                  <a:srgbClr val="7F7F7F"/>
+                </a:solidFill>
+              </a:rPr>
+              <a:t>products in </a:t>
             </a:r>
             <a:r>
               <a:rPr lang="en-US" sz="3200" dirty="0">

</xml_diff>